<commit_message>
first delivery finished but still pending changes such as scaling data
</commit_message>
<xml_diff>
--- a/Results.pptx
+++ b/Results.pptx
@@ -5,11 +5,12 @@
     <p:sldMasterId id="2147483660" r:id="rId4"/>
   </p:sldMasterIdLst>
   <p:notesMasterIdLst>
-    <p:notesMasterId r:id="rId7"/>
+    <p:notesMasterId r:id="rId8"/>
   </p:notesMasterIdLst>
   <p:sldIdLst>
     <p:sldId id="278" r:id="rId5"/>
     <p:sldId id="279" r:id="rId6"/>
+    <p:sldId id="280" r:id="rId7"/>
   </p:sldIdLst>
   <p:sldSz cx="12192000" cy="6858000"/>
   <p:notesSz cx="6858000" cy="9144000"/>
@@ -6478,7 +6479,7 @@
           </a:effectLst>
           <a:extLst>
             <a:ext uri="{91240B29-F687-4f45-9708-019B960494DF}">
-              <a14:hiddenLine xmlns="" xmlns:a14="http://schemas.microsoft.com/office/drawing/2010/main" xmlns:p14="http://schemas.microsoft.com/office/powerpoint/2010/main" xmlns:a16="http://schemas.microsoft.com/office/drawing/2014/main" w="9525">
+              <a14:hiddenLine xmlns:a16="http://schemas.microsoft.com/office/drawing/2014/main" xmlns:p14="http://schemas.microsoft.com/office/powerpoint/2010/main" xmlns:a14="http://schemas.microsoft.com/office/drawing/2010/main" xmlns="" w="9525">
                 <a:solidFill>
                   <a:srgbClr val="000000"/>
                 </a:solidFill>
@@ -6562,7 +6563,7 @@
             <a:pPr algn="l"/>
             <a:r>
               <a:rPr lang="en-US" sz="4000" dirty="0"/>
-              <a:t>Results</a:t>
+              <a:t>Car price prediction</a:t>
             </a:r>
           </a:p>
         </p:txBody>
@@ -6909,6 +6910,14 @@
           <a:p>
             <a:pPr lvl="1"/>
             <a:r>
+              <a:rPr lang="en-US" sz="2200"/>
+              <a:t>b = 3511.7</a:t>
+            </a:r>
+            <a:endParaRPr lang="en-US" sz="2200" dirty="0"/>
+          </a:p>
+          <a:p>
+            <a:pPr lvl="1"/>
+            <a:r>
               <a:rPr lang="en-US" sz="2200" dirty="0"/>
               <a:t>Coef. Of Det. testing = 0.21</a:t>
             </a:r>
@@ -6925,6 +6934,228 @@
     <p:extLst>
       <p:ext uri="{BB962C8B-B14F-4D97-AF65-F5344CB8AC3E}">
         <p14:creationId xmlns:p14="http://schemas.microsoft.com/office/powerpoint/2010/main" val="3220235682"/>
+      </p:ext>
+    </p:extLst>
+  </p:cSld>
+  <p:clrMapOvr>
+    <a:masterClrMapping/>
+  </p:clrMapOvr>
+</p:sld>
+</file>
+
+<file path=ppt/slides/slide3.xml><?xml version="1.0" encoding="utf-8"?>
+<p:sld xmlns:a="http://schemas.openxmlformats.org/drawingml/2006/main" xmlns:r="http://schemas.openxmlformats.org/officeDocument/2006/relationships" xmlns:p="http://schemas.openxmlformats.org/presentationml/2006/main">
+  <p:cSld>
+    <p:bg>
+      <p:bgPr>
+        <a:blipFill rotWithShape="1">
+          <a:blip r:embed="rId2">
+            <a:duotone>
+              <a:schemeClr val="bg1">
+                <a:shade val="80000"/>
+                <a:lumMod val="80000"/>
+              </a:schemeClr>
+              <a:schemeClr val="bg1">
+                <a:tint val="98000"/>
+              </a:schemeClr>
+            </a:duotone>
+          </a:blip>
+          <a:stretch/>
+        </a:blipFill>
+        <a:effectLst/>
+      </p:bgPr>
+    </p:bg>
+    <p:spTree>
+      <p:nvGrpSpPr>
+        <p:cNvPr id="1" name=""/>
+        <p:cNvGrpSpPr/>
+        <p:nvPr/>
+      </p:nvGrpSpPr>
+      <p:grpSpPr>
+        <a:xfrm>
+          <a:off x="0" y="0"/>
+          <a:ext cx="0" cy="0"/>
+          <a:chOff x="0" y="0"/>
+          <a:chExt cx="0" cy="0"/>
+        </a:xfrm>
+      </p:grpSpPr>
+      <p:sp>
+        <p:nvSpPr>
+          <p:cNvPr id="71" name="Rectangle 70">
+            <a:extLst>
+              <a:ext uri="{FF2B5EF4-FFF2-40B4-BE49-F238E27FC236}">
+                <a16:creationId xmlns:a16="http://schemas.microsoft.com/office/drawing/2014/main" id="{5C56FD3A-4F39-4752-AC00-DB25CCA4ED73}"/>
+              </a:ext>
+              <a:ext uri="{C183D7F6-B498-43B3-948B-1728B52AA6E4}">
+                <adec:decorative xmlns:adec="http://schemas.microsoft.com/office/drawing/2017/decorative" val="1"/>
+              </a:ext>
+            </a:extLst>
+          </p:cNvPr>
+          <p:cNvSpPr>
+            <a:spLocks noGrp="1" noRot="1" noChangeAspect="1" noMove="1" noResize="1" noEditPoints="1" noAdjustHandles="1" noChangeArrowheads="1" noChangeShapeType="1" noTextEdit="1"/>
+          </p:cNvSpPr>
+          <p:nvPr>
+            <p:extLst>
+              <p:ext uri="{386F3935-93C4-4BCD-93E2-E3B085C9AB24}">
+                <p16:designElem xmlns:p16="http://schemas.microsoft.com/office/powerpoint/2015/main" val="1"/>
+              </p:ext>
+            </p:extLst>
+          </p:nvPr>
+        </p:nvSpPr>
+        <p:spPr>
+          <a:xfrm>
+            <a:off x="483347" y="482600"/>
+            <a:ext cx="11240496" cy="5892800"/>
+          </a:xfrm>
+          <a:prstGeom prst="rect">
+            <a:avLst/>
+          </a:prstGeom>
+          <a:noFill/>
+          <a:ln w="190500">
+            <a:solidFill>
+              <a:schemeClr val="tx1">
+                <a:alpha val="7000"/>
+              </a:schemeClr>
+            </a:solidFill>
+          </a:ln>
+        </p:spPr>
+        <p:style>
+          <a:lnRef idx="2">
+            <a:schemeClr val="accent1">
+              <a:shade val="50000"/>
+            </a:schemeClr>
+          </a:lnRef>
+          <a:fillRef idx="1">
+            <a:schemeClr val="accent1"/>
+          </a:fillRef>
+          <a:effectRef idx="0">
+            <a:schemeClr val="accent1"/>
+          </a:effectRef>
+          <a:fontRef idx="minor">
+            <a:schemeClr val="lt1"/>
+          </a:fontRef>
+        </p:style>
+        <p:txBody>
+          <a:bodyPr rtlCol="0" anchor="ctr"/>
+          <a:lstStyle/>
+          <a:p>
+            <a:pPr algn="ctr"/>
+            <a:endParaRPr lang="en-US"/>
+          </a:p>
+        </p:txBody>
+      </p:sp>
+      <p:sp>
+        <p:nvSpPr>
+          <p:cNvPr id="73" name="Rectangle 72">
+            <a:extLst>
+              <a:ext uri="{FF2B5EF4-FFF2-40B4-BE49-F238E27FC236}">
+                <a16:creationId xmlns:a16="http://schemas.microsoft.com/office/drawing/2014/main" id="{772527DF-A25C-46B4-A5D9-BBE2E310ACAF}"/>
+              </a:ext>
+              <a:ext uri="{C183D7F6-B498-43B3-948B-1728B52AA6E4}">
+                <adec:decorative xmlns:adec="http://schemas.microsoft.com/office/drawing/2017/decorative" val="1"/>
+              </a:ext>
+            </a:extLst>
+          </p:cNvPr>
+          <p:cNvSpPr>
+            <a:spLocks noGrp="1" noRot="1" noChangeAspect="1" noMove="1" noResize="1" noEditPoints="1" noAdjustHandles="1" noChangeArrowheads="1" noChangeShapeType="1" noTextEdit="1"/>
+          </p:cNvSpPr>
+          <p:nvPr>
+            <p:extLst>
+              <p:ext uri="{386F3935-93C4-4BCD-93E2-E3B085C9AB24}">
+                <p16:designElem xmlns:p16="http://schemas.microsoft.com/office/powerpoint/2015/main" val="1"/>
+              </p:ext>
+            </p:extLst>
+          </p:nvPr>
+        </p:nvSpPr>
+        <p:spPr>
+          <a:xfrm>
+            <a:off x="483347" y="482600"/>
+            <a:ext cx="11240496" cy="5892800"/>
+          </a:xfrm>
+          <a:prstGeom prst="rect">
+            <a:avLst/>
+          </a:prstGeom>
+          <a:solidFill>
+            <a:srgbClr val="FFFFFF"/>
+          </a:solidFill>
+          <a:ln>
+            <a:noFill/>
+          </a:ln>
+        </p:spPr>
+        <p:style>
+          <a:lnRef idx="2">
+            <a:schemeClr val="accent1">
+              <a:shade val="50000"/>
+            </a:schemeClr>
+          </a:lnRef>
+          <a:fillRef idx="1">
+            <a:schemeClr val="accent1"/>
+          </a:fillRef>
+          <a:effectRef idx="0">
+            <a:schemeClr val="accent1"/>
+          </a:effectRef>
+          <a:fontRef idx="minor">
+            <a:schemeClr val="lt1"/>
+          </a:fontRef>
+        </p:style>
+        <p:txBody>
+          <a:bodyPr rtlCol="0" anchor="ctr"/>
+          <a:lstStyle/>
+          <a:p>
+            <a:pPr algn="ctr"/>
+            <a:endParaRPr lang="en-US"/>
+          </a:p>
+        </p:txBody>
+      </p:sp>
+      <p:pic>
+        <p:nvPicPr>
+          <p:cNvPr id="1026" name="Picture 2" descr="What is the Coefficient of Determination | R Square – Data Science Duniya">
+            <a:extLst>
+              <a:ext uri="{FF2B5EF4-FFF2-40B4-BE49-F238E27FC236}">
+                <a16:creationId xmlns:a16="http://schemas.microsoft.com/office/drawing/2014/main" id="{8D4D65A3-0D07-4A44-B524-991F78CEE256}"/>
+              </a:ext>
+            </a:extLst>
+          </p:cNvPr>
+          <p:cNvPicPr>
+            <a:picLocks noChangeAspect="1" noChangeArrowheads="1"/>
+          </p:cNvPicPr>
+          <p:nvPr/>
+        </p:nvPicPr>
+        <p:blipFill rotWithShape="1">
+          <a:blip r:embed="rId3">
+            <a:extLst>
+              <a:ext uri="{28A0092B-C50C-407E-A947-70E740481C1C}">
+                <a14:useLocalDpi xmlns:a14="http://schemas.microsoft.com/office/drawing/2010/main" val="0"/>
+              </a:ext>
+            </a:extLst>
+          </a:blip>
+          <a:srcRect t="10248" r="1" b="23564"/>
+          <a:stretch/>
+        </p:blipFill>
+        <p:spPr bwMode="auto">
+          <a:xfrm>
+            <a:off x="643467" y="902758"/>
+            <a:ext cx="10905066" cy="5052483"/>
+          </a:xfrm>
+          <a:prstGeom prst="rect">
+            <a:avLst/>
+          </a:prstGeom>
+          <a:noFill/>
+          <a:extLst>
+            <a:ext uri="{909E8E84-426E-40DD-AFC4-6F175D3DCCD1}">
+              <a14:hiddenFill xmlns:a14="http://schemas.microsoft.com/office/drawing/2010/main">
+                <a:solidFill>
+                  <a:srgbClr val="FFFFFF"/>
+                </a:solidFill>
+              </a14:hiddenFill>
+            </a:ext>
+          </a:extLst>
+        </p:spPr>
+      </p:pic>
+    </p:spTree>
+    <p:extLst>
+      <p:ext uri="{BB962C8B-B14F-4D97-AF65-F5344CB8AC3E}">
+        <p14:creationId xmlns:p14="http://schemas.microsoft.com/office/powerpoint/2010/main" val="1911415133"/>
       </p:ext>
     </p:extLst>
   </p:cSld>
@@ -7498,6 +7729,24 @@
 </file>
 
 <file path=customXml/item1.xml><?xml version="1.0" encoding="utf-8"?>
+<?mso-contentType ?>
+<FormTemplates xmlns="http://schemas.microsoft.com/sharepoint/v3/contenttype/forms">
+  <Display>DocumentLibraryForm</Display>
+  <Edit>DocumentLibraryForm</Edit>
+  <New>DocumentLibraryForm</New>
+</FormTemplates>
+</file>
+
+<file path=customXml/item2.xml><?xml version="1.0" encoding="utf-8"?>
+<p:properties xmlns:p="http://schemas.microsoft.com/office/2006/metadata/properties" xmlns:xsi="http://www.w3.org/2001/XMLSchema-instance" xmlns:pc="http://schemas.microsoft.com/office/infopath/2007/PartnerControls">
+  <documentManagement>
+    <Status xmlns="71af3243-3dd4-4a8d-8c0d-dd76da1f02a5">Not started</Status>
+    <MediaServiceKeyPoints xmlns="71af3243-3dd4-4a8d-8c0d-dd76da1f02a5" xsi:nil="true"/>
+  </documentManagement>
+</p:properties>
+</file>
+
+<file path=customXml/item3.xml><?xml version="1.0" encoding="utf-8"?>
 <ct:contentTypeSchema xmlns:ct="http://schemas.microsoft.com/office/2006/metadata/contentType" xmlns:ma="http://schemas.microsoft.com/office/2006/metadata/properties/metaAttributes" ct:_="" ma:_="" ma:contentTypeName="Document" ma:contentTypeID="0x01010079F111ED35F8CC479449609E8A0923A6" ma:contentTypeVersion="12" ma:contentTypeDescription="Create a new document." ma:contentTypeScope="" ma:versionID="a410dd7f93c95333ffa1b60ed6adedd1">
   <xsd:schema xmlns:xsd="http://www.w3.org/2001/XMLSchema" xmlns:xs="http://www.w3.org/2001/XMLSchema" xmlns:p="http://schemas.microsoft.com/office/2006/metadata/properties" xmlns:ns2="71af3243-3dd4-4a8d-8c0d-dd76da1f02a5" xmlns:ns3="16c05727-aa75-4e4a-9b5f-8a80a1165891" targetNamespace="http://schemas.microsoft.com/office/2006/metadata/properties" ma:root="true" ma:fieldsID="a936d9baba76aa3866493feff160faab" ns2:_="" ns3:_="">
     <xsd:import namespace="71af3243-3dd4-4a8d-8c0d-dd76da1f02a5"/>
@@ -7718,25 +7967,25 @@
 </ct:contentTypeSchema>
 </file>
 
-<file path=customXml/item2.xml><?xml version="1.0" encoding="utf-8"?>
-<p:properties xmlns:p="http://schemas.microsoft.com/office/2006/metadata/properties" xmlns:xsi="http://www.w3.org/2001/XMLSchema-instance" xmlns:pc="http://schemas.microsoft.com/office/infopath/2007/PartnerControls">
-  <documentManagement>
-    <Status xmlns="71af3243-3dd4-4a8d-8c0d-dd76da1f02a5">Not started</Status>
-    <MediaServiceKeyPoints xmlns="71af3243-3dd4-4a8d-8c0d-dd76da1f02a5" xsi:nil="true"/>
-  </documentManagement>
-</p:properties>
+<file path=customXml/itemProps1.xml><?xml version="1.0" encoding="utf-8"?>
+<ds:datastoreItem xmlns:ds="http://schemas.openxmlformats.org/officeDocument/2006/customXml" ds:itemID="{64B270AB-C138-415C-897E-3C24487DECF1}">
+  <ds:schemaRefs>
+    <ds:schemaRef ds:uri="http://schemas.microsoft.com/sharepoint/v3/contenttype/forms"/>
+  </ds:schemaRefs>
+</ds:datastoreItem>
 </file>
 
-<file path=customXml/item3.xml><?xml version="1.0" encoding="utf-8"?>
-<?mso-contentType ?>
-<FormTemplates xmlns="http://schemas.microsoft.com/sharepoint/v3/contenttype/forms">
-  <Display>DocumentLibraryForm</Display>
-  <Edit>DocumentLibraryForm</Edit>
-  <New>DocumentLibraryForm</New>
-</FormTemplates>
+<file path=customXml/itemProps2.xml><?xml version="1.0" encoding="utf-8"?>
+<ds:datastoreItem xmlns:ds="http://schemas.openxmlformats.org/officeDocument/2006/customXml" ds:itemID="{2C4C00F4-06E9-43E3-AD97-88A857CEFA82}">
+  <ds:schemaRefs>
+    <ds:schemaRef ds:uri="http://schemas.microsoft.com/office/2006/metadata/properties"/>
+    <ds:schemaRef ds:uri="http://schemas.microsoft.com/office/infopath/2007/PartnerControls"/>
+    <ds:schemaRef ds:uri="71af3243-3dd4-4a8d-8c0d-dd76da1f02a5"/>
+  </ds:schemaRefs>
+</ds:datastoreItem>
 </file>
 
-<file path=customXml/itemProps1.xml><?xml version="1.0" encoding="utf-8"?>
+<file path=customXml/itemProps3.xml><?xml version="1.0" encoding="utf-8"?>
 <ds:datastoreItem xmlns:ds="http://schemas.openxmlformats.org/officeDocument/2006/customXml" ds:itemID="{0585E981-8C91-4205-A0C3-C991F42B4C9E}">
   <ds:schemaRefs>
     <ds:schemaRef ds:uri="http://schemas.microsoft.com/office/2006/metadata/contentType"/>
@@ -7753,22 +8002,4 @@
     <ds:schemaRef ds:uri="http://schemas.microsoft.com/internal/obd"/>
   </ds:schemaRefs>
 </ds:datastoreItem>
-</file>
-
-<file path=customXml/itemProps2.xml><?xml version="1.0" encoding="utf-8"?>
-<ds:datastoreItem xmlns:ds="http://schemas.openxmlformats.org/officeDocument/2006/customXml" ds:itemID="{2C4C00F4-06E9-43E3-AD97-88A857CEFA82}">
-  <ds:schemaRefs>
-    <ds:schemaRef ds:uri="http://schemas.microsoft.com/office/2006/metadata/properties"/>
-    <ds:schemaRef ds:uri="http://schemas.microsoft.com/office/infopath/2007/PartnerControls"/>
-    <ds:schemaRef ds:uri="71af3243-3dd4-4a8d-8c0d-dd76da1f02a5"/>
-  </ds:schemaRefs>
-</ds:datastoreItem>
-</file>
-
-<file path=customXml/itemProps3.xml><?xml version="1.0" encoding="utf-8"?>
-<ds:datastoreItem xmlns:ds="http://schemas.openxmlformats.org/officeDocument/2006/customXml" ds:itemID="{64B270AB-C138-415C-897E-3C24487DECF1}">
-  <ds:schemaRefs>
-    <ds:schemaRef ds:uri="http://schemas.microsoft.com/sharepoint/v3/contenttype/forms"/>
-  </ds:schemaRefs>
-</ds:datastoreItem>
 </file>
</xml_diff>